<commit_message>
Added New powerpoint and poster
</commit_message>
<xml_diff>
--- a/TeamToo_presentation.pptx
+++ b/TeamToo_presentation.pptx
@@ -5,10 +5,10 @@
     <p:sldMasterId id="2147483696" r:id="rId2"/>
   </p:sldMasterIdLst>
   <p:notesMasterIdLst>
-    <p:notesMasterId r:id="rId16"/>
+    <p:notesMasterId r:id="rId19"/>
   </p:notesMasterIdLst>
   <p:handoutMasterIdLst>
-    <p:handoutMasterId r:id="rId17"/>
+    <p:handoutMasterId r:id="rId20"/>
   </p:handoutMasterIdLst>
   <p:sldIdLst>
     <p:sldId id="258" r:id="rId3"/>
@@ -16,14 +16,17 @@
     <p:sldId id="260" r:id="rId5"/>
     <p:sldId id="261" r:id="rId6"/>
     <p:sldId id="262" r:id="rId7"/>
-    <p:sldId id="263" r:id="rId8"/>
-    <p:sldId id="264" r:id="rId9"/>
-    <p:sldId id="271" r:id="rId10"/>
-    <p:sldId id="265" r:id="rId11"/>
-    <p:sldId id="266" r:id="rId12"/>
-    <p:sldId id="267" r:id="rId13"/>
-    <p:sldId id="268" r:id="rId14"/>
-    <p:sldId id="270" r:id="rId15"/>
+    <p:sldId id="272" r:id="rId8"/>
+    <p:sldId id="263" r:id="rId9"/>
+    <p:sldId id="264" r:id="rId10"/>
+    <p:sldId id="273" r:id="rId11"/>
+    <p:sldId id="271" r:id="rId12"/>
+    <p:sldId id="265" r:id="rId13"/>
+    <p:sldId id="274" r:id="rId14"/>
+    <p:sldId id="266" r:id="rId15"/>
+    <p:sldId id="267" r:id="rId16"/>
+    <p:sldId id="268" r:id="rId17"/>
+    <p:sldId id="270" r:id="rId18"/>
   </p:sldIdLst>
   <p:sldSz cx="12192000" cy="6858000"/>
   <p:notesSz cx="6858000" cy="9144000"/>
@@ -226,7 +229,7 @@
           <a:p>
             <a:fld id="{8906F081-8781-4431-8FD4-2CF608CD7C47}" type="datetimeFigureOut">
               <a:rPr lang="en-US" smtClean="0"/>
-              <a:t>11/30/2015</a:t>
+              <a:t>12/1/2015</a:t>
             </a:fld>
             <a:endParaRPr lang="en-US"/>
           </a:p>
@@ -391,7 +394,7 @@
           <a:p>
             <a:fld id="{F06CA47C-B7FD-4BE9-B0E6-81BA758D95F2}" type="datetimeFigureOut">
               <a:rPr lang="en-US" smtClean="0"/>
-              <a:t>11/30/2015</a:t>
+              <a:t>12/1/2015</a:t>
             </a:fld>
             <a:endParaRPr lang="en-US"/>
           </a:p>
@@ -773,13 +776,11 @@
         <p:spPr/>
         <p:txBody>
           <a:bodyPr/>
-          <a:lstStyle>
-            <a:extLst/>
-          </a:lstStyle>
+          <a:lstStyle/>
           <a:p>
             <a:fld id="{33024136-D290-48F3-A182-4C46BEB5146B}" type="datetime1">
               <a:rPr lang="en-US" smtClean="0"/>
-              <a:t>11/30/2015</a:t>
+              <a:t>12/1/2015</a:t>
             </a:fld>
             <a:endParaRPr lang="en-US"/>
           </a:p>
@@ -798,9 +799,7 @@
         <p:spPr/>
         <p:txBody>
           <a:bodyPr/>
-          <a:lstStyle>
-            <a:extLst/>
-          </a:lstStyle>
+          <a:lstStyle/>
           <a:p>
             <a:endParaRPr lang="en-US"/>
           </a:p>
@@ -819,9 +818,7 @@
         <p:spPr/>
         <p:txBody>
           <a:bodyPr/>
-          <a:lstStyle>
-            <a:extLst/>
-          </a:lstStyle>
+          <a:lstStyle/>
           <a:p>
             <a:fld id="{401CF334-2D5C-4859-84A6-CA7E6E43FAEB}" type="slidenum">
               <a:rPr lang="en-US" smtClean="0"/>
@@ -991,9 +988,7 @@
         <p:spPr/>
         <p:txBody>
           <a:bodyPr/>
-          <a:lstStyle>
-            <a:extLst/>
-          </a:lstStyle>
+          <a:lstStyle/>
           <a:p>
             <a:r>
               <a:rPr kumimoji="0" lang="en-US" smtClean="0"/>
@@ -1016,9 +1011,7 @@
         <p:spPr/>
         <p:txBody>
           <a:bodyPr vert="eaVert"/>
-          <a:lstStyle>
-            <a:extLst/>
-          </a:lstStyle>
+          <a:lstStyle/>
           <a:p>
             <a:pPr lvl="0" eaLnBrk="1" latinLnBrk="0" hangingPunct="1"/>
             <a:r>
@@ -1070,13 +1063,11 @@
         <p:spPr/>
         <p:txBody>
           <a:bodyPr/>
-          <a:lstStyle>
-            <a:extLst/>
-          </a:lstStyle>
+          <a:lstStyle/>
           <a:p>
             <a:fld id="{9CC7D44C-38B1-4D0F-9006-D5774F331095}" type="datetime1">
               <a:rPr lang="en-US" smtClean="0"/>
-              <a:t>11/30/2015</a:t>
+              <a:t>12/1/2015</a:t>
             </a:fld>
             <a:endParaRPr lang="en-US"/>
           </a:p>
@@ -1095,9 +1086,7 @@
         <p:spPr/>
         <p:txBody>
           <a:bodyPr/>
-          <a:lstStyle>
-            <a:extLst/>
-          </a:lstStyle>
+          <a:lstStyle/>
           <a:p>
             <a:endParaRPr lang="en-US"/>
           </a:p>
@@ -1116,9 +1105,7 @@
         <p:spPr/>
         <p:txBody>
           <a:bodyPr/>
-          <a:lstStyle>
-            <a:extLst/>
-          </a:lstStyle>
+          <a:lstStyle/>
           <a:p>
             <a:fld id="{401CF334-2D5C-4859-84A6-CA7E6E43FAEB}" type="slidenum">
               <a:rPr lang="en-US" smtClean="0"/>
@@ -1188,9 +1175,7 @@
         </p:spPr>
         <p:txBody>
           <a:bodyPr vert="eaVert" anchor="ctr"/>
-          <a:lstStyle>
-            <a:extLst/>
-          </a:lstStyle>
+          <a:lstStyle/>
           <a:p>
             <a:r>
               <a:rPr kumimoji="0" lang="en-US" smtClean="0"/>
@@ -1218,9 +1203,7 @@
         </p:spPr>
         <p:txBody>
           <a:bodyPr vert="eaVert"/>
-          <a:lstStyle>
-            <a:extLst/>
-          </a:lstStyle>
+          <a:lstStyle/>
           <a:p>
             <a:pPr lvl="0" eaLnBrk="1" latinLnBrk="0" hangingPunct="1"/>
             <a:r>
@@ -1272,13 +1255,11 @@
         <p:spPr/>
         <p:txBody>
           <a:bodyPr/>
-          <a:lstStyle>
-            <a:extLst/>
-          </a:lstStyle>
+          <a:lstStyle/>
           <a:p>
             <a:fld id="{F98D518A-FD4F-4358-B95B-9DB5A17160FB}" type="datetime1">
               <a:rPr lang="en-US" smtClean="0"/>
-              <a:t>11/30/2015</a:t>
+              <a:t>12/1/2015</a:t>
             </a:fld>
             <a:endParaRPr lang="en-US"/>
           </a:p>
@@ -1297,9 +1278,7 @@
         <p:spPr/>
         <p:txBody>
           <a:bodyPr/>
-          <a:lstStyle>
-            <a:extLst/>
-          </a:lstStyle>
+          <a:lstStyle/>
           <a:p>
             <a:endParaRPr lang="en-US"/>
           </a:p>
@@ -1318,9 +1297,7 @@
         <p:spPr/>
         <p:txBody>
           <a:bodyPr/>
-          <a:lstStyle>
-            <a:extLst/>
-          </a:lstStyle>
+          <a:lstStyle/>
           <a:p>
             <a:fld id="{401CF334-2D5C-4859-84A6-CA7E6E43FAEB}" type="slidenum">
               <a:rPr lang="en-US" smtClean="0"/>
@@ -1417,9 +1394,7 @@
         <p:spPr/>
         <p:txBody>
           <a:bodyPr/>
-          <a:lstStyle>
-            <a:extLst/>
-          </a:lstStyle>
+          <a:lstStyle/>
           <a:p>
             <a:pPr lvl="0" eaLnBrk="1" latinLnBrk="0" hangingPunct="1"/>
             <a:r>
@@ -1471,13 +1446,11 @@
         <p:spPr/>
         <p:txBody>
           <a:bodyPr/>
-          <a:lstStyle>
-            <a:extLst/>
-          </a:lstStyle>
+          <a:lstStyle/>
           <a:p>
             <a:fld id="{5E2A9F4F-03AD-4497-A65D-076601BD41D2}" type="datetime1">
               <a:rPr lang="en-US" smtClean="0"/>
-              <a:t>11/30/2015</a:t>
+              <a:t>12/1/2015</a:t>
             </a:fld>
             <a:endParaRPr lang="en-US"/>
           </a:p>
@@ -1496,9 +1469,7 @@
         <p:spPr/>
         <p:txBody>
           <a:bodyPr/>
-          <a:lstStyle>
-            <a:extLst/>
-          </a:lstStyle>
+          <a:lstStyle/>
           <a:p>
             <a:endParaRPr lang="en-US"/>
           </a:p>
@@ -1517,9 +1488,7 @@
         <p:spPr/>
         <p:txBody>
           <a:bodyPr/>
-          <a:lstStyle>
-            <a:extLst/>
-          </a:lstStyle>
+          <a:lstStyle/>
           <a:p>
             <a:fld id="{401CF334-2D5C-4859-84A6-CA7E6E43FAEB}" type="slidenum">
               <a:rPr lang="en-US" smtClean="0"/>
@@ -1664,13 +1633,11 @@
         <p:spPr/>
         <p:txBody>
           <a:bodyPr/>
-          <a:lstStyle>
-            <a:extLst/>
-          </a:lstStyle>
+          <a:lstStyle/>
           <a:p>
             <a:fld id="{EDFBF3AC-A781-43AA-8BD5-B12F49168B94}" type="datetime1">
               <a:rPr lang="en-US" smtClean="0"/>
-              <a:t>11/30/2015</a:t>
+              <a:t>12/1/2015</a:t>
             </a:fld>
             <a:endParaRPr lang="en-US"/>
           </a:p>
@@ -1689,9 +1656,7 @@
         <p:spPr/>
         <p:txBody>
           <a:bodyPr/>
-          <a:lstStyle>
-            <a:extLst/>
-          </a:lstStyle>
+          <a:lstStyle/>
           <a:p>
             <a:endParaRPr lang="en-US"/>
           </a:p>
@@ -1710,9 +1675,7 @@
         <p:spPr/>
         <p:txBody>
           <a:bodyPr/>
-          <a:lstStyle>
-            <a:extLst/>
-          </a:lstStyle>
+          <a:lstStyle/>
           <a:p>
             <a:fld id="{401CF334-2D5C-4859-84A6-CA7E6E43FAEB}" type="slidenum">
               <a:rPr lang="en-US" smtClean="0"/>
@@ -1816,9 +1779,7 @@
         </p:spPr>
         <p:txBody>
           <a:bodyPr/>
-          <a:lstStyle>
-            <a:extLst/>
-          </a:lstStyle>
+          <a:lstStyle/>
           <a:p>
             <a:r>
               <a:rPr kumimoji="0" lang="en-US" smtClean="0"/>
@@ -1989,13 +1950,11 @@
         <p:spPr/>
         <p:txBody>
           <a:bodyPr/>
-          <a:lstStyle>
-            <a:extLst/>
-          </a:lstStyle>
+          <a:lstStyle/>
           <a:p>
             <a:fld id="{C5256A41-C91B-43FF-9881-F5DA9878418F}" type="datetime1">
               <a:rPr lang="en-US" smtClean="0"/>
-              <a:t>11/30/2015</a:t>
+              <a:t>12/1/2015</a:t>
             </a:fld>
             <a:endParaRPr lang="en-US"/>
           </a:p>
@@ -2014,9 +1973,7 @@
         <p:spPr/>
         <p:txBody>
           <a:bodyPr/>
-          <a:lstStyle>
-            <a:extLst/>
-          </a:lstStyle>
+          <a:lstStyle/>
           <a:p>
             <a:endParaRPr lang="en-US"/>
           </a:p>
@@ -2035,9 +1992,7 @@
         <p:spPr/>
         <p:txBody>
           <a:bodyPr/>
-          <a:lstStyle>
-            <a:extLst/>
-          </a:lstStyle>
+          <a:lstStyle/>
           <a:p>
             <a:fld id="{401CF334-2D5C-4859-84A6-CA7E6E43FAEB}" type="slidenum">
               <a:rPr lang="en-US" smtClean="0"/>
@@ -2391,13 +2346,11 @@
         <p:spPr/>
         <p:txBody>
           <a:bodyPr/>
-          <a:lstStyle>
-            <a:extLst/>
-          </a:lstStyle>
+          <a:lstStyle/>
           <a:p>
             <a:fld id="{FFD7AA76-41EE-4C13-950E-E611B8B8FC52}" type="datetime1">
               <a:rPr lang="en-US" smtClean="0"/>
-              <a:t>11/30/2015</a:t>
+              <a:t>12/1/2015</a:t>
             </a:fld>
             <a:endParaRPr lang="en-US"/>
           </a:p>
@@ -2416,9 +2369,7 @@
         <p:spPr/>
         <p:txBody>
           <a:bodyPr/>
-          <a:lstStyle>
-            <a:extLst/>
-          </a:lstStyle>
+          <a:lstStyle/>
           <a:p>
             <a:endParaRPr lang="en-US"/>
           </a:p>
@@ -2437,9 +2388,7 @@
         <p:spPr/>
         <p:txBody>
           <a:bodyPr/>
-          <a:lstStyle>
-            <a:extLst/>
-          </a:lstStyle>
+          <a:lstStyle/>
           <a:p>
             <a:fld id="{401CF334-2D5C-4859-84A6-CA7E6E43FAEB}" type="slidenum">
               <a:rPr lang="en-US" smtClean="0"/>
@@ -2537,13 +2486,11 @@
         <p:spPr/>
         <p:txBody>
           <a:bodyPr/>
-          <a:lstStyle>
-            <a:extLst/>
-          </a:lstStyle>
+          <a:lstStyle/>
           <a:p>
             <a:fld id="{89407A26-E7BC-4498-97E4-87AF12377CA9}" type="datetime1">
               <a:rPr lang="en-US" smtClean="0"/>
-              <a:t>11/30/2015</a:t>
+              <a:t>12/1/2015</a:t>
             </a:fld>
             <a:endParaRPr lang="en-US"/>
           </a:p>
@@ -2562,9 +2509,7 @@
         <p:spPr/>
         <p:txBody>
           <a:bodyPr/>
-          <a:lstStyle>
-            <a:extLst/>
-          </a:lstStyle>
+          <a:lstStyle/>
           <a:p>
             <a:endParaRPr lang="en-US"/>
           </a:p>
@@ -2583,9 +2528,7 @@
         <p:spPr/>
         <p:txBody>
           <a:bodyPr/>
-          <a:lstStyle>
-            <a:extLst/>
-          </a:lstStyle>
+          <a:lstStyle/>
           <a:p>
             <a:fld id="{401CF334-2D5C-4859-84A6-CA7E6E43FAEB}" type="slidenum">
               <a:rPr lang="en-US" smtClean="0"/>
@@ -2650,13 +2593,11 @@
         <p:spPr/>
         <p:txBody>
           <a:bodyPr/>
-          <a:lstStyle>
-            <a:extLst/>
-          </a:lstStyle>
+          <a:lstStyle/>
           <a:p>
             <a:fld id="{93EA4171-1117-4486-993C-35A7470D8847}" type="datetime1">
               <a:rPr lang="en-US" smtClean="0"/>
-              <a:t>11/30/2015</a:t>
+              <a:t>12/1/2015</a:t>
             </a:fld>
             <a:endParaRPr lang="en-US"/>
           </a:p>
@@ -2675,9 +2616,7 @@
         <p:spPr/>
         <p:txBody>
           <a:bodyPr/>
-          <a:lstStyle>
-            <a:extLst/>
-          </a:lstStyle>
+          <a:lstStyle/>
           <a:p>
             <a:endParaRPr lang="en-US"/>
           </a:p>
@@ -2696,9 +2635,7 @@
         <p:spPr/>
         <p:txBody>
           <a:bodyPr/>
-          <a:lstStyle>
-            <a:extLst/>
-          </a:lstStyle>
+          <a:lstStyle/>
           <a:p>
             <a:fld id="{401CF334-2D5C-4859-84A6-CA7E6E43FAEB}" type="slidenum">
               <a:rPr lang="en-US" smtClean="0"/>
@@ -2921,13 +2858,11 @@
         <p:spPr/>
         <p:txBody>
           <a:bodyPr/>
-          <a:lstStyle>
-            <a:extLst/>
-          </a:lstStyle>
+          <a:lstStyle/>
           <a:p>
             <a:fld id="{472A4CB8-1563-4663-81DB-74EB416C19BE}" type="datetime1">
               <a:rPr lang="en-US" smtClean="0"/>
-              <a:t>11/30/2015</a:t>
+              <a:t>12/1/2015</a:t>
             </a:fld>
             <a:endParaRPr lang="en-US"/>
           </a:p>
@@ -2946,9 +2881,7 @@
         <p:spPr/>
         <p:txBody>
           <a:bodyPr/>
-          <a:lstStyle>
-            <a:extLst/>
-          </a:lstStyle>
+          <a:lstStyle/>
           <a:p>
             <a:endParaRPr lang="en-US"/>
           </a:p>
@@ -2967,9 +2900,7 @@
         <p:spPr/>
         <p:txBody>
           <a:bodyPr/>
-          <a:lstStyle>
-            <a:extLst/>
-          </a:lstStyle>
+          <a:lstStyle/>
           <a:p>
             <a:fld id="{401CF334-2D5C-4859-84A6-CA7E6E43FAEB}" type="slidenum">
               <a:rPr lang="en-US" smtClean="0"/>
@@ -3062,9 +2993,7 @@
         </p:style>
         <p:txBody>
           <a:bodyPr anchor="ctr"/>
-          <a:lstStyle>
-            <a:extLst/>
-          </a:lstStyle>
+          <a:lstStyle/>
           <a:p>
             <a:pPr algn="ctr" eaLnBrk="1" latinLnBrk="0" hangingPunct="1"/>
             <a:endParaRPr kumimoji="0" lang="en-US" sz="1800"/>
@@ -3254,13 +3183,11 @@
         </p:spPr>
         <p:txBody>
           <a:bodyPr/>
-          <a:lstStyle>
-            <a:extLst/>
-          </a:lstStyle>
+          <a:lstStyle/>
           <a:p>
             <a:fld id="{0C6724CE-2468-448B-87C1-A92EDD78369B}" type="datetime1">
               <a:rPr lang="en-US" smtClean="0"/>
-              <a:t>11/30/2015</a:t>
+              <a:t>12/1/2015</a:t>
             </a:fld>
             <a:endParaRPr lang="en-US"/>
           </a:p>
@@ -3284,9 +3211,7 @@
         </p:spPr>
         <p:txBody>
           <a:bodyPr/>
-          <a:lstStyle>
-            <a:extLst/>
-          </a:lstStyle>
+          <a:lstStyle/>
           <a:p>
             <a:endParaRPr lang="en-US"/>
           </a:p>
@@ -3310,9 +3235,7 @@
         </p:spPr>
         <p:txBody>
           <a:bodyPr/>
-          <a:lstStyle>
-            <a:extLst/>
-          </a:lstStyle>
+          <a:lstStyle/>
           <a:p>
             <a:fld id="{401CF334-2D5C-4859-84A6-CA7E6E43FAEB}" type="slidenum">
               <a:rPr lang="en-US" smtClean="0"/>
@@ -3401,9 +3324,7 @@
           <a:bodyPr vert="horz" anchor="t">
             <a:noAutofit/>
           </a:bodyPr>
-          <a:lstStyle>
-            <a:extLst/>
-          </a:lstStyle>
+          <a:lstStyle/>
           <a:p>
             <a:r>
               <a:rPr kumimoji="0" lang="en-US" smtClean="0"/>
@@ -3436,9 +3357,7 @@
           <a:bodyPr vert="horz">
             <a:normAutofit/>
           </a:bodyPr>
-          <a:lstStyle>
-            <a:extLst/>
-          </a:lstStyle>
+          <a:lstStyle/>
           <a:p>
             <a:pPr lvl="0" eaLnBrk="1" latinLnBrk="0" hangingPunct="1"/>
             <a:r>
@@ -3511,7 +3430,7 @@
           <a:p>
             <a:fld id="{4CD11720-76E7-46E6-B0AA-057287C42052}" type="datetime1">
               <a:rPr lang="en-US" smtClean="0"/>
-              <a:t>11/30/2015</a:t>
+              <a:t>12/1/2015</a:t>
             </a:fld>
             <a:endParaRPr lang="en-US"/>
           </a:p>
@@ -4034,7 +3953,7 @@
           <a:p>
             <a:r>
               <a:rPr lang="en-US" dirty="0" smtClean="0"/>
-              <a:t>Tests</a:t>
+              <a:t>Demo</a:t>
             </a:r>
             <a:endParaRPr lang="en-US" dirty="0"/>
           </a:p>
@@ -4052,201 +3971,21 @@
         </p:nvSpPr>
         <p:spPr/>
         <p:txBody>
-          <a:bodyPr>
-            <a:normAutofit fontScale="70000" lnSpcReduction="20000"/>
-          </a:bodyPr>
-          <a:lstStyle/>
-          <a:p>
-            <a:r>
-              <a:rPr lang="en-US" dirty="0" smtClean="0"/>
-              <a:t>Tests passed or failed by comparing the </a:t>
-            </a:r>
-            <a:r>
-              <a:rPr lang="en-US" dirty="0" err="1" smtClean="0"/>
-              <a:t>EnDe</a:t>
-            </a:r>
-            <a:r>
-              <a:rPr lang="en-US" dirty="0" smtClean="0"/>
-              <a:t> output (from the GUI or straight from the function) to an oracle we obtained through outside sources (Python built-in methods, websites, by hand, other programs, </a:t>
-            </a:r>
-            <a:r>
-              <a:rPr lang="en-US" dirty="0" err="1" smtClean="0"/>
-              <a:t>etc</a:t>
-            </a:r>
-            <a:r>
-              <a:rPr lang="en-US" dirty="0" smtClean="0"/>
-              <a:t>)</a:t>
-            </a:r>
-          </a:p>
-          <a:p>
-            <a:r>
-              <a:rPr lang="en-US" dirty="0" smtClean="0"/>
-              <a:t>To add a new test, a new file in the </a:t>
-            </a:r>
-            <a:r>
-              <a:rPr lang="en-US" dirty="0" err="1" smtClean="0"/>
-              <a:t>testCases</a:t>
-            </a:r>
-            <a:r>
-              <a:rPr lang="en-US" dirty="0" smtClean="0"/>
-              <a:t> directory can be added with the appropriate information</a:t>
-            </a:r>
-          </a:p>
-          <a:p>
-            <a:r>
-              <a:rPr lang="en-US" dirty="0" smtClean="0"/>
-              <a:t>For JavaScript tests, a file must include: </a:t>
-            </a:r>
-            <a:r>
-              <a:rPr lang="en-US" dirty="0" err="1" smtClean="0"/>
-              <a:t>test_number</a:t>
-            </a:r>
-            <a:r>
-              <a:rPr lang="en-US" dirty="0" smtClean="0"/>
-              <a:t>, </a:t>
-            </a:r>
-            <a:r>
-              <a:rPr lang="en-US" dirty="0" err="1" smtClean="0"/>
-              <a:t>requirement_being_tested</a:t>
-            </a:r>
-            <a:r>
-              <a:rPr lang="en-US" dirty="0" smtClean="0"/>
-              <a:t>, </a:t>
-            </a:r>
-            <a:r>
-              <a:rPr lang="en-US" dirty="0" err="1" smtClean="0"/>
-              <a:t>component_being_tested</a:t>
-            </a:r>
-            <a:r>
-              <a:rPr lang="en-US" dirty="0" smtClean="0"/>
-              <a:t>, </a:t>
-            </a:r>
-            <a:r>
-              <a:rPr lang="en-US" dirty="0" err="1" smtClean="0"/>
-              <a:t>method_being_tested</a:t>
-            </a:r>
-            <a:r>
-              <a:rPr lang="en-US" dirty="0" smtClean="0"/>
-              <a:t>, </a:t>
-            </a:r>
-            <a:r>
-              <a:rPr lang="en-US" dirty="0" err="1" smtClean="0"/>
-              <a:t>test_input</a:t>
-            </a:r>
-            <a:r>
-              <a:rPr lang="en-US" dirty="0" smtClean="0"/>
-              <a:t>, </a:t>
-            </a:r>
-            <a:r>
-              <a:rPr lang="en-US" dirty="0" err="1" smtClean="0"/>
-              <a:t>expected_outcome</a:t>
-            </a:r>
-            <a:r>
-              <a:rPr lang="en-US" dirty="0" smtClean="0"/>
-              <a:t>, language, </a:t>
-            </a:r>
-            <a:r>
-              <a:rPr lang="en-US" dirty="0" err="1" smtClean="0"/>
-              <a:t>method_invocation</a:t>
-            </a:r>
-            <a:r>
-              <a:rPr lang="en-US" dirty="0" smtClean="0"/>
-              <a:t>, and arity</a:t>
-            </a:r>
-          </a:p>
-          <a:p>
-            <a:r>
-              <a:rPr lang="en-US" dirty="0" smtClean="0"/>
-              <a:t>For Python tests, a file must include: </a:t>
-            </a:r>
-            <a:r>
-              <a:rPr lang="en-US" dirty="0" err="1" smtClean="0"/>
-              <a:t>test_number</a:t>
-            </a:r>
-            <a:r>
-              <a:rPr lang="en-US" dirty="0" smtClean="0"/>
-              <a:t>, </a:t>
-            </a:r>
-            <a:r>
-              <a:rPr lang="en-US" dirty="0" err="1" smtClean="0"/>
-              <a:t>requirement_being_tested</a:t>
-            </a:r>
-            <a:r>
-              <a:rPr lang="en-US" dirty="0" smtClean="0"/>
-              <a:t>, </a:t>
-            </a:r>
-            <a:r>
-              <a:rPr lang="en-US" dirty="0" err="1" smtClean="0"/>
-              <a:t>component_being_tested</a:t>
-            </a:r>
-            <a:r>
-              <a:rPr lang="en-US" dirty="0" smtClean="0"/>
-              <a:t>, </a:t>
-            </a:r>
-            <a:r>
-              <a:rPr lang="en-US" dirty="0" err="1" smtClean="0"/>
-              <a:t>method_being_tested</a:t>
-            </a:r>
-            <a:r>
-              <a:rPr lang="en-US" dirty="0" smtClean="0"/>
-              <a:t>, </a:t>
-            </a:r>
-            <a:r>
-              <a:rPr lang="en-US" dirty="0" err="1" smtClean="0"/>
-              <a:t>test_input</a:t>
-            </a:r>
-            <a:r>
-              <a:rPr lang="en-US" dirty="0" smtClean="0"/>
-              <a:t>, </a:t>
-            </a:r>
-            <a:r>
-              <a:rPr lang="en-US" dirty="0" err="1" smtClean="0"/>
-              <a:t>expected_outcome</a:t>
-            </a:r>
-            <a:r>
-              <a:rPr lang="en-US" dirty="0" smtClean="0"/>
-              <a:t>, language, </a:t>
-            </a:r>
-            <a:r>
-              <a:rPr lang="en-US" dirty="0" err="1" smtClean="0"/>
-              <a:t>list_number</a:t>
-            </a:r>
-            <a:r>
-              <a:rPr lang="en-US" dirty="0" smtClean="0"/>
-              <a:t>, and </a:t>
-            </a:r>
-            <a:r>
-              <a:rPr lang="en-US" dirty="0" err="1" smtClean="0"/>
-              <a:t>link_id</a:t>
-            </a:r>
-            <a:endParaRPr lang="en-US" dirty="0" smtClean="0"/>
-          </a:p>
-          <a:p>
-            <a:r>
-              <a:rPr lang="en-US" dirty="0" smtClean="0"/>
-              <a:t>For JavaScript tests, the income</a:t>
-            </a:r>
-            <a:r>
-              <a:rPr lang="en-US" dirty="0"/>
-              <a:t> </a:t>
-            </a:r>
-            <a:r>
-              <a:rPr lang="en-US" dirty="0" smtClean="0"/>
-              <a:t>and outcome must be in quotes to denote a string</a:t>
-            </a:r>
-          </a:p>
-          <a:p>
-            <a:r>
-              <a:rPr lang="en-US" dirty="0" smtClean="0"/>
-              <a:t>For Python tests, the income and outcome should not be in quotes, as they are read from the file as a string already</a:t>
-            </a:r>
+          <a:bodyPr/>
+          <a:lstStyle/>
+          <a:p>
+            <a:r>
+              <a:rPr lang="en-US" dirty="0" smtClean="0"/>
+              <a:t>Please join us for a demo of our automated testing framework.</a:t>
+            </a:r>
+            <a:endParaRPr lang="en-US" dirty="0"/>
           </a:p>
         </p:txBody>
       </p:sp>
     </p:spTree>
     <p:extLst>
       <p:ext uri="{BB962C8B-B14F-4D97-AF65-F5344CB8AC3E}">
-        <p14:creationId xmlns:p14="http://schemas.microsoft.com/office/powerpoint/2010/main" val="2547854382"/>
+        <p14:creationId xmlns:p14="http://schemas.microsoft.com/office/powerpoint/2010/main" val="1662294202"/>
       </p:ext>
     </p:extLst>
   </p:cSld>
@@ -4302,56 +4041,40 @@
           <a:p>
             <a:r>
               <a:rPr lang="en-US" dirty="0" smtClean="0"/>
-              <a:t>Fault Injection</a:t>
+              <a:t>The Framework: The Test Case Files</a:t>
             </a:r>
             <a:endParaRPr lang="en-US" dirty="0"/>
           </a:p>
         </p:txBody>
       </p:sp>
-      <p:sp>
-        <p:nvSpPr>
-          <p:cNvPr id="3" name="Content Placeholder 2"/>
-          <p:cNvSpPr>
-            <a:spLocks noGrp="1"/>
-          </p:cNvSpPr>
-          <p:nvPr>
-            <p:ph idx="1"/>
-          </p:nvPr>
-        </p:nvSpPr>
-        <p:spPr/>
-        <p:txBody>
-          <a:bodyPr/>
-          <a:lstStyle/>
-          <a:p>
-            <a:r>
-              <a:rPr lang="en-US" dirty="0" smtClean="0"/>
-              <a:t>To add and remove faults from the code, we have add_faults.sh and remove_faults.sh, which swap out the original code with faulty code</a:t>
-            </a:r>
-          </a:p>
-          <a:p>
-            <a:r>
-              <a:rPr lang="en-US" dirty="0" smtClean="0"/>
-              <a:t>The tests that now fail due to fault injection are 10, 11, 12, 15, and 18</a:t>
-            </a:r>
-          </a:p>
-          <a:p>
-            <a:r>
-              <a:rPr lang="en-US" dirty="0" smtClean="0"/>
-              <a:t>To run only these tests, runAllTests.py can be run with additional arguments to isolate the failed tests. The command to run only the failed tests is: “python ./scripts/runAllTests.py 10 11 12 15 18”</a:t>
-            </a:r>
-          </a:p>
-          <a:p>
-            <a:pPr marL="68580" indent="0">
-              <a:buNone/>
-            </a:pPr>
-            <a:endParaRPr lang="en-US" dirty="0"/>
-          </a:p>
-        </p:txBody>
-      </p:sp>
+      <p:pic>
+        <p:nvPicPr>
+          <p:cNvPr id="4" name="Picture 3"/>
+          <p:cNvPicPr>
+            <a:picLocks noChangeAspect="1"/>
+          </p:cNvPicPr>
+          <p:nvPr/>
+        </p:nvPicPr>
+        <p:blipFill>
+          <a:blip r:embed="rId2"/>
+          <a:stretch>
+            <a:fillRect/>
+          </a:stretch>
+        </p:blipFill>
+        <p:spPr>
+          <a:xfrm>
+            <a:off x="1219200" y="1576385"/>
+            <a:ext cx="9492150" cy="4537031"/>
+          </a:xfrm>
+          <a:prstGeom prst="rect">
+            <a:avLst/>
+          </a:prstGeom>
+        </p:spPr>
+      </p:pic>
     </p:spTree>
     <p:extLst>
       <p:ext uri="{BB962C8B-B14F-4D97-AF65-F5344CB8AC3E}">
-        <p14:creationId xmlns:p14="http://schemas.microsoft.com/office/powerpoint/2010/main" val="845577674"/>
+        <p14:creationId xmlns:p14="http://schemas.microsoft.com/office/powerpoint/2010/main" val="3358293752"/>
       </p:ext>
     </p:extLst>
   </p:cSld>
@@ -4407,6 +4130,475 @@
           <a:p>
             <a:r>
               <a:rPr lang="en-US" dirty="0" smtClean="0"/>
+              <a:t>The Framework: The Test Case Files</a:t>
+            </a:r>
+            <a:endParaRPr lang="en-US" dirty="0"/>
+          </a:p>
+        </p:txBody>
+      </p:sp>
+      <p:pic>
+        <p:nvPicPr>
+          <p:cNvPr id="5" name="Picture 4"/>
+          <p:cNvPicPr>
+            <a:picLocks noChangeAspect="1"/>
+          </p:cNvPicPr>
+          <p:nvPr/>
+        </p:nvPicPr>
+        <p:blipFill>
+          <a:blip r:embed="rId2"/>
+          <a:stretch>
+            <a:fillRect/>
+          </a:stretch>
+        </p:blipFill>
+        <p:spPr>
+          <a:xfrm>
+            <a:off x="1219200" y="1426464"/>
+            <a:ext cx="10195348" cy="4817582"/>
+          </a:xfrm>
+          <a:prstGeom prst="rect">
+            <a:avLst/>
+          </a:prstGeom>
+        </p:spPr>
+      </p:pic>
+    </p:spTree>
+    <p:extLst>
+      <p:ext uri="{BB962C8B-B14F-4D97-AF65-F5344CB8AC3E}">
+        <p14:creationId xmlns:p14="http://schemas.microsoft.com/office/powerpoint/2010/main" val="1689129887"/>
+      </p:ext>
+    </p:extLst>
+  </p:cSld>
+  <p:clrMapOvr>
+    <a:masterClrMapping/>
+  </p:clrMapOvr>
+  <mc:AlternateContent xmlns:mc="http://schemas.openxmlformats.org/markup-compatibility/2006" xmlns:p14="http://schemas.microsoft.com/office/powerpoint/2010/main">
+    <mc:Choice Requires="p14">
+      <p:transition spd="med" p14:dur="700">
+        <p:fade/>
+      </p:transition>
+    </mc:Choice>
+    <mc:Fallback xmlns="">
+      <p:transition spd="med">
+        <p:fade/>
+      </p:transition>
+    </mc:Fallback>
+  </mc:AlternateContent>
+</p:sld>
+</file>
+
+<file path=ppt/slides/slide13.xml><?xml version="1.0" encoding="utf-8"?>
+<p:sld xmlns:a="http://schemas.openxmlformats.org/drawingml/2006/main" xmlns:r="http://schemas.openxmlformats.org/officeDocument/2006/relationships" xmlns:p="http://schemas.openxmlformats.org/presentationml/2006/main">
+  <p:cSld>
+    <p:spTree>
+      <p:nvGrpSpPr>
+        <p:cNvPr id="1" name=""/>
+        <p:cNvGrpSpPr/>
+        <p:nvPr/>
+      </p:nvGrpSpPr>
+      <p:grpSpPr>
+        <a:xfrm>
+          <a:off x="0" y="0"/>
+          <a:ext cx="0" cy="0"/>
+          <a:chOff x="0" y="0"/>
+          <a:chExt cx="0" cy="0"/>
+        </a:xfrm>
+      </p:grpSpPr>
+      <p:sp>
+        <p:nvSpPr>
+          <p:cNvPr id="2" name="Title 1"/>
+          <p:cNvSpPr>
+            <a:spLocks noGrp="1"/>
+          </p:cNvSpPr>
+          <p:nvPr>
+            <p:ph type="title"/>
+          </p:nvPr>
+        </p:nvSpPr>
+        <p:spPr/>
+        <p:txBody>
+          <a:bodyPr/>
+          <a:lstStyle/>
+          <a:p>
+            <a:r>
+              <a:rPr lang="en-US" dirty="0" smtClean="0"/>
+              <a:t>Tests</a:t>
+            </a:r>
+            <a:endParaRPr lang="en-US" dirty="0"/>
+          </a:p>
+        </p:txBody>
+      </p:sp>
+      <p:sp>
+        <p:nvSpPr>
+          <p:cNvPr id="3" name="Content Placeholder 2"/>
+          <p:cNvSpPr>
+            <a:spLocks noGrp="1"/>
+          </p:cNvSpPr>
+          <p:nvPr>
+            <p:ph idx="1"/>
+          </p:nvPr>
+        </p:nvSpPr>
+        <p:spPr/>
+        <p:txBody>
+          <a:bodyPr>
+            <a:normAutofit fontScale="70000" lnSpcReduction="20000"/>
+          </a:bodyPr>
+          <a:lstStyle/>
+          <a:p>
+            <a:r>
+              <a:rPr lang="en-US" dirty="0" smtClean="0"/>
+              <a:t>Tests passed or failed by comparing the </a:t>
+            </a:r>
+            <a:r>
+              <a:rPr lang="en-US" dirty="0" err="1" smtClean="0"/>
+              <a:t>EnDe</a:t>
+            </a:r>
+            <a:r>
+              <a:rPr lang="en-US" dirty="0" smtClean="0"/>
+              <a:t> output (from the GUI or straight from the function) to an oracle we obtained through outside sources (Python built-in methods, websites, by hand, other programs, </a:t>
+            </a:r>
+            <a:r>
+              <a:rPr lang="en-US" dirty="0" err="1" smtClean="0"/>
+              <a:t>etc</a:t>
+            </a:r>
+            <a:r>
+              <a:rPr lang="en-US" dirty="0" smtClean="0"/>
+              <a:t>)</a:t>
+            </a:r>
+          </a:p>
+          <a:p>
+            <a:r>
+              <a:rPr lang="en-US" dirty="0" smtClean="0"/>
+              <a:t>To add a new test, a new file in the </a:t>
+            </a:r>
+            <a:r>
+              <a:rPr lang="en-US" dirty="0" err="1" smtClean="0"/>
+              <a:t>testCases</a:t>
+            </a:r>
+            <a:r>
+              <a:rPr lang="en-US" dirty="0" smtClean="0"/>
+              <a:t> directory can be added with the appropriate information</a:t>
+            </a:r>
+          </a:p>
+          <a:p>
+            <a:r>
+              <a:rPr lang="en-US" dirty="0" smtClean="0"/>
+              <a:t>For JavaScript tests, a file must include: </a:t>
+            </a:r>
+            <a:r>
+              <a:rPr lang="en-US" dirty="0" err="1" smtClean="0"/>
+              <a:t>test_number</a:t>
+            </a:r>
+            <a:r>
+              <a:rPr lang="en-US" dirty="0" smtClean="0"/>
+              <a:t>, </a:t>
+            </a:r>
+            <a:r>
+              <a:rPr lang="en-US" dirty="0" err="1" smtClean="0"/>
+              <a:t>requirement_being_tested</a:t>
+            </a:r>
+            <a:r>
+              <a:rPr lang="en-US" dirty="0" smtClean="0"/>
+              <a:t>, </a:t>
+            </a:r>
+            <a:r>
+              <a:rPr lang="en-US" dirty="0" err="1" smtClean="0"/>
+              <a:t>component_being_tested</a:t>
+            </a:r>
+            <a:r>
+              <a:rPr lang="en-US" dirty="0" smtClean="0"/>
+              <a:t>, </a:t>
+            </a:r>
+            <a:r>
+              <a:rPr lang="en-US" dirty="0" err="1" smtClean="0"/>
+              <a:t>method_being_tested</a:t>
+            </a:r>
+            <a:r>
+              <a:rPr lang="en-US" dirty="0" smtClean="0"/>
+              <a:t>, </a:t>
+            </a:r>
+            <a:r>
+              <a:rPr lang="en-US" dirty="0" err="1" smtClean="0"/>
+              <a:t>test_input</a:t>
+            </a:r>
+            <a:r>
+              <a:rPr lang="en-US" dirty="0" smtClean="0"/>
+              <a:t>, </a:t>
+            </a:r>
+            <a:r>
+              <a:rPr lang="en-US" dirty="0" err="1" smtClean="0"/>
+              <a:t>expected_outcome</a:t>
+            </a:r>
+            <a:r>
+              <a:rPr lang="en-US" dirty="0" smtClean="0"/>
+              <a:t>, language, </a:t>
+            </a:r>
+            <a:r>
+              <a:rPr lang="en-US" dirty="0" err="1" smtClean="0"/>
+              <a:t>method_invocation</a:t>
+            </a:r>
+            <a:r>
+              <a:rPr lang="en-US" dirty="0" smtClean="0"/>
+              <a:t>, and arity</a:t>
+            </a:r>
+          </a:p>
+          <a:p>
+            <a:r>
+              <a:rPr lang="en-US" dirty="0" smtClean="0"/>
+              <a:t>For Python tests, a file must include: </a:t>
+            </a:r>
+            <a:r>
+              <a:rPr lang="en-US" dirty="0" err="1" smtClean="0"/>
+              <a:t>test_number</a:t>
+            </a:r>
+            <a:r>
+              <a:rPr lang="en-US" dirty="0" smtClean="0"/>
+              <a:t>, </a:t>
+            </a:r>
+            <a:r>
+              <a:rPr lang="en-US" dirty="0" err="1" smtClean="0"/>
+              <a:t>requirement_being_tested</a:t>
+            </a:r>
+            <a:r>
+              <a:rPr lang="en-US" dirty="0" smtClean="0"/>
+              <a:t>, </a:t>
+            </a:r>
+            <a:r>
+              <a:rPr lang="en-US" dirty="0" err="1" smtClean="0"/>
+              <a:t>component_being_tested</a:t>
+            </a:r>
+            <a:r>
+              <a:rPr lang="en-US" dirty="0" smtClean="0"/>
+              <a:t>, </a:t>
+            </a:r>
+            <a:r>
+              <a:rPr lang="en-US" dirty="0" err="1" smtClean="0"/>
+              <a:t>method_being_tested</a:t>
+            </a:r>
+            <a:r>
+              <a:rPr lang="en-US" dirty="0" smtClean="0"/>
+              <a:t>, </a:t>
+            </a:r>
+            <a:r>
+              <a:rPr lang="en-US" dirty="0" err="1" smtClean="0"/>
+              <a:t>test_input</a:t>
+            </a:r>
+            <a:r>
+              <a:rPr lang="en-US" dirty="0" smtClean="0"/>
+              <a:t>, </a:t>
+            </a:r>
+            <a:r>
+              <a:rPr lang="en-US" dirty="0" err="1" smtClean="0"/>
+              <a:t>expected_outcome</a:t>
+            </a:r>
+            <a:r>
+              <a:rPr lang="en-US" dirty="0" smtClean="0"/>
+              <a:t>, language, </a:t>
+            </a:r>
+            <a:r>
+              <a:rPr lang="en-US" dirty="0" err="1" smtClean="0"/>
+              <a:t>list_number</a:t>
+            </a:r>
+            <a:r>
+              <a:rPr lang="en-US" dirty="0" smtClean="0"/>
+              <a:t>, and </a:t>
+            </a:r>
+            <a:r>
+              <a:rPr lang="en-US" dirty="0" err="1" smtClean="0"/>
+              <a:t>link_id</a:t>
+            </a:r>
+            <a:endParaRPr lang="en-US" dirty="0" smtClean="0"/>
+          </a:p>
+          <a:p>
+            <a:r>
+              <a:rPr lang="en-US" dirty="0" smtClean="0"/>
+              <a:t>For JavaScript tests, the income</a:t>
+            </a:r>
+            <a:r>
+              <a:rPr lang="en-US" dirty="0"/>
+              <a:t> </a:t>
+            </a:r>
+            <a:r>
+              <a:rPr lang="en-US" dirty="0" smtClean="0"/>
+              <a:t>and outcome must be in quotes to denote a string</a:t>
+            </a:r>
+          </a:p>
+          <a:p>
+            <a:r>
+              <a:rPr lang="en-US" dirty="0" smtClean="0"/>
+              <a:t>For Python tests, the income and outcome should not be in quotes, as they are read from the file as a string already</a:t>
+            </a:r>
+          </a:p>
+        </p:txBody>
+      </p:sp>
+    </p:spTree>
+    <p:extLst>
+      <p:ext uri="{BB962C8B-B14F-4D97-AF65-F5344CB8AC3E}">
+        <p14:creationId xmlns:p14="http://schemas.microsoft.com/office/powerpoint/2010/main" val="2547854382"/>
+      </p:ext>
+    </p:extLst>
+  </p:cSld>
+  <p:clrMapOvr>
+    <a:masterClrMapping/>
+  </p:clrMapOvr>
+  <mc:AlternateContent xmlns:mc="http://schemas.openxmlformats.org/markup-compatibility/2006" xmlns:p14="http://schemas.microsoft.com/office/powerpoint/2010/main">
+    <mc:Choice Requires="p14">
+      <p:transition spd="med" p14:dur="700">
+        <p:fade/>
+      </p:transition>
+    </mc:Choice>
+    <mc:Fallback xmlns="">
+      <p:transition spd="med">
+        <p:fade/>
+      </p:transition>
+    </mc:Fallback>
+  </mc:AlternateContent>
+</p:sld>
+</file>
+
+<file path=ppt/slides/slide14.xml><?xml version="1.0" encoding="utf-8"?>
+<p:sld xmlns:a="http://schemas.openxmlformats.org/drawingml/2006/main" xmlns:r="http://schemas.openxmlformats.org/officeDocument/2006/relationships" xmlns:p="http://schemas.openxmlformats.org/presentationml/2006/main">
+  <p:cSld>
+    <p:spTree>
+      <p:nvGrpSpPr>
+        <p:cNvPr id="1" name=""/>
+        <p:cNvGrpSpPr/>
+        <p:nvPr/>
+      </p:nvGrpSpPr>
+      <p:grpSpPr>
+        <a:xfrm>
+          <a:off x="0" y="0"/>
+          <a:ext cx="0" cy="0"/>
+          <a:chOff x="0" y="0"/>
+          <a:chExt cx="0" cy="0"/>
+        </a:xfrm>
+      </p:grpSpPr>
+      <p:sp>
+        <p:nvSpPr>
+          <p:cNvPr id="2" name="Title 1"/>
+          <p:cNvSpPr>
+            <a:spLocks noGrp="1"/>
+          </p:cNvSpPr>
+          <p:nvPr>
+            <p:ph type="title"/>
+          </p:nvPr>
+        </p:nvSpPr>
+        <p:spPr/>
+        <p:txBody>
+          <a:bodyPr/>
+          <a:lstStyle/>
+          <a:p>
+            <a:r>
+              <a:rPr lang="en-US" dirty="0" smtClean="0"/>
+              <a:t>Fault Injection</a:t>
+            </a:r>
+            <a:endParaRPr lang="en-US" dirty="0"/>
+          </a:p>
+        </p:txBody>
+      </p:sp>
+      <p:sp>
+        <p:nvSpPr>
+          <p:cNvPr id="3" name="Content Placeholder 2"/>
+          <p:cNvSpPr>
+            <a:spLocks noGrp="1"/>
+          </p:cNvSpPr>
+          <p:nvPr>
+            <p:ph idx="1"/>
+          </p:nvPr>
+        </p:nvSpPr>
+        <p:spPr/>
+        <p:txBody>
+          <a:bodyPr>
+            <a:normAutofit lnSpcReduction="10000"/>
+          </a:bodyPr>
+          <a:lstStyle/>
+          <a:p>
+            <a:r>
+              <a:rPr lang="en-US" dirty="0" smtClean="0"/>
+              <a:t>To add and remove faults from the code, we have add_faults.sh and remove_faults.sh, which swap out the original code with faulty </a:t>
+            </a:r>
+            <a:r>
+              <a:rPr lang="en-US" dirty="0" smtClean="0"/>
+              <a:t>code (found in the scripts directory)</a:t>
+            </a:r>
+            <a:endParaRPr lang="en-US" dirty="0" smtClean="0"/>
+          </a:p>
+          <a:p>
+            <a:r>
+              <a:rPr lang="en-US" dirty="0" smtClean="0"/>
+              <a:t>The tests that now fail due to fault injection are 10, 11, 12, 15, and 18</a:t>
+            </a:r>
+          </a:p>
+          <a:p>
+            <a:r>
+              <a:rPr lang="en-US" dirty="0" smtClean="0"/>
+              <a:t>To run only these tests, runAllTests.py can be run with additional arguments to isolate the failed tests. The command to run only the failed tests is: “python ./scripts/runAllTests.py 10 11 12 15 18”</a:t>
+            </a:r>
+          </a:p>
+          <a:p>
+            <a:pPr marL="68580" indent="0">
+              <a:buNone/>
+            </a:pPr>
+            <a:endParaRPr lang="en-US" dirty="0"/>
+          </a:p>
+        </p:txBody>
+      </p:sp>
+    </p:spTree>
+    <p:extLst>
+      <p:ext uri="{BB962C8B-B14F-4D97-AF65-F5344CB8AC3E}">
+        <p14:creationId xmlns:p14="http://schemas.microsoft.com/office/powerpoint/2010/main" val="845577674"/>
+      </p:ext>
+    </p:extLst>
+  </p:cSld>
+  <p:clrMapOvr>
+    <a:masterClrMapping/>
+  </p:clrMapOvr>
+  <mc:AlternateContent xmlns:mc="http://schemas.openxmlformats.org/markup-compatibility/2006" xmlns:p14="http://schemas.microsoft.com/office/powerpoint/2010/main">
+    <mc:Choice Requires="p14">
+      <p:transition spd="med" p14:dur="700">
+        <p:fade/>
+      </p:transition>
+    </mc:Choice>
+    <mc:Fallback xmlns="">
+      <p:transition spd="med">
+        <p:fade/>
+      </p:transition>
+    </mc:Fallback>
+  </mc:AlternateContent>
+</p:sld>
+</file>
+
+<file path=ppt/slides/slide15.xml><?xml version="1.0" encoding="utf-8"?>
+<p:sld xmlns:a="http://schemas.openxmlformats.org/drawingml/2006/main" xmlns:r="http://schemas.openxmlformats.org/officeDocument/2006/relationships" xmlns:p="http://schemas.openxmlformats.org/presentationml/2006/main">
+  <p:cSld>
+    <p:spTree>
+      <p:nvGrpSpPr>
+        <p:cNvPr id="1" name=""/>
+        <p:cNvGrpSpPr/>
+        <p:nvPr/>
+      </p:nvGrpSpPr>
+      <p:grpSpPr>
+        <a:xfrm>
+          <a:off x="0" y="0"/>
+          <a:ext cx="0" cy="0"/>
+          <a:chOff x="0" y="0"/>
+          <a:chExt cx="0" cy="0"/>
+        </a:xfrm>
+      </p:grpSpPr>
+      <p:sp>
+        <p:nvSpPr>
+          <p:cNvPr id="2" name="Title 1"/>
+          <p:cNvSpPr>
+            <a:spLocks noGrp="1"/>
+          </p:cNvSpPr>
+          <p:nvPr>
+            <p:ph type="title"/>
+          </p:nvPr>
+        </p:nvSpPr>
+        <p:spPr/>
+        <p:txBody>
+          <a:bodyPr/>
+          <a:lstStyle/>
+          <a:p>
+            <a:r>
+              <a:rPr lang="en-US" dirty="0" smtClean="0"/>
               <a:t>Fault Injection: Modifications</a:t>
             </a:r>
             <a:endParaRPr lang="en-US" dirty="0"/>
@@ -4860,7 +5052,7 @@
 </p:sld>
 </file>
 
-<file path=ppt/slides/slide13.xml><?xml version="1.0" encoding="utf-8"?>
+<file path=ppt/slides/slide16.xml><?xml version="1.0" encoding="utf-8"?>
 <p:sld xmlns:a="http://schemas.openxmlformats.org/drawingml/2006/main" xmlns:r="http://schemas.openxmlformats.org/officeDocument/2006/relationships" xmlns:p="http://schemas.openxmlformats.org/presentationml/2006/main">
   <p:cSld>
     <p:spTree>
@@ -4997,11 +5189,7 @@
             <a:pPr lvl="0"/>
             <a:r>
               <a:rPr lang="en-US" dirty="0" smtClean="0"/>
-              <a:t>The </a:t>
-            </a:r>
-            <a:r>
-              <a:rPr lang="en-US" dirty="0" smtClean="0"/>
-              <a:t>Framework</a:t>
+              <a:t>The Framework</a:t>
             </a:r>
           </a:p>
           <a:p>
@@ -5010,7 +5198,6 @@
               <a:rPr lang="en-US" dirty="0" smtClean="0"/>
               <a:t>Demo</a:t>
             </a:r>
-            <a:endParaRPr lang="en-US" dirty="0" smtClean="0"/>
           </a:p>
           <a:p>
             <a:pPr lvl="0"/>
@@ -5023,13 +5210,8 @@
             <a:pPr lvl="0"/>
             <a:r>
               <a:rPr lang="en-US" dirty="0" smtClean="0"/>
-              <a:t>Fault </a:t>
-            </a:r>
-            <a:r>
-              <a:rPr lang="en-US" dirty="0" smtClean="0"/>
-              <a:t>Injection</a:t>
-            </a:r>
-            <a:endParaRPr lang="en-US" dirty="0" smtClean="0"/>
+              <a:t>Fault Injection</a:t>
+            </a:r>
           </a:p>
           <a:p>
             <a:pPr lvl="0"/>
@@ -5182,7 +5364,27 @@
             </a:r>
             <a:r>
               <a:rPr lang="en-US" dirty="0" smtClean="0"/>
-              <a:t> only requires that you have a web browser installed and a single folder to install files into. It is run from its “index.html” file. </a:t>
+              <a:t> </a:t>
+            </a:r>
+            <a:r>
+              <a:rPr lang="en-US" dirty="0" smtClean="0"/>
+              <a:t>requires </a:t>
+            </a:r>
+            <a:r>
+              <a:rPr lang="en-US" dirty="0" smtClean="0"/>
+              <a:t>that you have </a:t>
+            </a:r>
+            <a:r>
+              <a:rPr lang="en-US" dirty="0" smtClean="0"/>
+              <a:t>the Firefox web browser installed </a:t>
+            </a:r>
+            <a:r>
+              <a:rPr lang="en-US" dirty="0" smtClean="0"/>
+              <a:t>and a single folder to install files into. It is run from its “index.html” file. </a:t>
+            </a:r>
+            <a:r>
+              <a:rPr lang="en-US" dirty="0" smtClean="0"/>
+              <a:t>Besides that, all that is needed is python (version 2) and the selenium python package.</a:t>
             </a:r>
             <a:endParaRPr lang="en-US" dirty="0"/>
           </a:p>
@@ -5240,7 +5442,12 @@
             <p:ph type="title"/>
           </p:nvPr>
         </p:nvSpPr>
-        <p:spPr/>
+        <p:spPr>
+          <a:xfrm>
+            <a:off x="1219200" y="237744"/>
+            <a:ext cx="10363200" cy="914400"/>
+          </a:xfrm>
+        </p:spPr>
         <p:txBody>
           <a:bodyPr/>
           <a:lstStyle/>
@@ -5284,8 +5491,8 @@
         </p:blipFill>
         <p:spPr bwMode="auto">
           <a:xfrm>
-            <a:off x="3601027" y="1426464"/>
-            <a:ext cx="5599545" cy="3988392"/>
+            <a:off x="1219200" y="969264"/>
+            <a:ext cx="8267553" cy="5888736"/>
           </a:xfrm>
           <a:prstGeom prst="rect">
             <a:avLst/>
@@ -5380,7 +5587,7 @@
         <p:spPr/>
         <p:txBody>
           <a:bodyPr>
-            <a:normAutofit fontScale="77500" lnSpcReduction="20000"/>
+            <a:normAutofit fontScale="92500" lnSpcReduction="20000"/>
           </a:bodyPr>
           <a:lstStyle/>
           <a:p>
@@ -5401,33 +5608,23 @@
           <a:p>
             <a:r>
               <a:rPr lang="en-US" dirty="0" smtClean="0"/>
-              <a:t>We ran into issues using Chrome, as it requires us to disable security features all together to work properly without considering the scripts malicious. Firefox needed to be used for our tests.</a:t>
-            </a:r>
-          </a:p>
-          <a:p>
-            <a:pPr marL="68580" indent="0">
-              <a:buNone/>
-            </a:pPr>
+              <a:t>We ran into issues using Chrome, as it requires us to disable security features all together to work properly without considering the scripts malicious. Firefox needed to be used for our tests</a:t>
+            </a:r>
+            <a:r>
+              <a:rPr lang="en-US" dirty="0" smtClean="0"/>
+              <a:t>.</a:t>
+            </a:r>
             <a:endParaRPr lang="en-US" dirty="0" smtClean="0"/>
           </a:p>
           <a:p>
             <a:r>
               <a:rPr lang="en-US" dirty="0" smtClean="0"/>
-              <a:t>Some functions could not be tested in the browser, as they returned characters the browser did not recognize.</a:t>
-            </a:r>
-          </a:p>
-          <a:p>
-            <a:pPr marL="68580" indent="0">
-              <a:buNone/>
-            </a:pPr>
-            <a:endParaRPr lang="en-US" dirty="0" smtClean="0"/>
-          </a:p>
-          <a:p>
-            <a:r>
-              <a:rPr lang="en-US" dirty="0" smtClean="0"/>
-              <a:t>Other functions that returned non-UTF-8 encoded characters broke the reporting when writing to our results.html files. For example, the AES-128 encoding caused issues and had to be avoided for the time being.</a:t>
-            </a:r>
-            <a:endParaRPr lang="en-US" dirty="0"/>
+              <a:t>Other functions that returned non-UTF-8 encoded characters broke the reporting when writing to our results.html files. For example, the AES-128 encoding caused issues and had to be avoided for the time being</a:t>
+            </a:r>
+            <a:r>
+              <a:rPr lang="en-US" dirty="0" smtClean="0"/>
+              <a:t>.</a:t>
+            </a:r>
           </a:p>
         </p:txBody>
       </p:sp>
@@ -5489,10 +5686,9 @@
           <a:lstStyle/>
           <a:p>
             <a:r>
-              <a:rPr lang="en-US" dirty="0" smtClean="0"/>
-              <a:t>The Framework: Architecture</a:t>
-            </a:r>
-            <a:endParaRPr lang="en-US" dirty="0"/>
+              <a:rPr lang="en-US" dirty="0"/>
+              <a:t>Lessons Learned/Experiences</a:t>
+            </a:r>
           </a:p>
         </p:txBody>
       </p:sp>
@@ -5509,225 +5705,41 @@
         <p:spPr>
           <a:xfrm>
             <a:off x="1219200" y="1783560"/>
-            <a:ext cx="10363200" cy="4762713"/>
+            <a:ext cx="10363200" cy="4734806"/>
           </a:xfrm>
         </p:spPr>
         <p:txBody>
           <a:bodyPr>
-            <a:normAutofit fontScale="40000" lnSpcReduction="20000"/>
+            <a:normAutofit fontScale="85000" lnSpcReduction="20000"/>
           </a:bodyPr>
           <a:lstStyle/>
           <a:p>
-            <a:pPr marL="68580" indent="0">
-              <a:buNone/>
-            </a:pPr>
-            <a:r>
-              <a:rPr lang="en-US" dirty="0" smtClean="0"/>
-              <a:t>/</a:t>
-            </a:r>
-            <a:r>
-              <a:rPr lang="en-US" dirty="0" err="1"/>
-              <a:t>TestAutomation</a:t>
+            <a:r>
+              <a:rPr lang="en-US" dirty="0" smtClean="0"/>
+              <a:t>Each test creates a new selenium web driver. This was done  to keep the test isolated from the effects of other tests. The cost of this is that running our tests on virtual machines with usually no more than half the memory of our actual computer and software-defined hardware, spawning and this killing off this many instances of Firefox can quickly slow the system. So while running the tests on a contemporary </a:t>
+            </a:r>
+            <a:r>
+              <a:rPr lang="en-US" dirty="0" err="1" smtClean="0"/>
+              <a:t>Macbook</a:t>
+            </a:r>
+            <a:r>
+              <a:rPr lang="en-US" dirty="0" smtClean="0"/>
+              <a:t> Pro with 4GB of RAM allocated to the VM can run all 25 tests in succession, computers with lower specs will often timeout as Firefox is loading.</a:t>
+            </a:r>
+          </a:p>
+          <a:p>
+            <a:r>
+              <a:rPr lang="en-US" dirty="0" smtClean="0"/>
+              <a:t>In the end, with this being a hardware issue (i.e. not the a fault of the framework) coupled with the fact we wanted to keep are tests isolated, we have opted not to keep our tests isolated from one another in this manner. </a:t>
             </a:r>
             <a:endParaRPr lang="en-US" dirty="0"/>
-          </a:p>
-          <a:p>
-            <a:pPr marL="68580" indent="0">
-              <a:buNone/>
-            </a:pPr>
-            <a:r>
-              <a:rPr lang="en-US" dirty="0"/>
-              <a:t>    /project </a:t>
-            </a:r>
-          </a:p>
-          <a:p>
-            <a:pPr marL="68580" indent="0">
-              <a:buNone/>
-            </a:pPr>
-            <a:r>
-              <a:rPr lang="en-US" dirty="0"/>
-              <a:t>       /</a:t>
-            </a:r>
-            <a:r>
-              <a:rPr lang="en-US" dirty="0" err="1"/>
-              <a:t>src</a:t>
-            </a:r>
-            <a:endParaRPr lang="en-US" dirty="0"/>
-          </a:p>
-          <a:p>
-            <a:pPr marL="68580" indent="0">
-              <a:buNone/>
-            </a:pPr>
-            <a:r>
-              <a:rPr lang="en-US" dirty="0"/>
-              <a:t>       /bin</a:t>
-            </a:r>
-          </a:p>
-          <a:p>
-            <a:pPr marL="68580" indent="0">
-              <a:buNone/>
-            </a:pPr>
-            <a:r>
-              <a:rPr lang="en-US" dirty="0"/>
-              <a:t>    /scripts</a:t>
-            </a:r>
-          </a:p>
-          <a:p>
-            <a:pPr marL="68580" indent="0">
-              <a:buNone/>
-            </a:pPr>
-            <a:r>
-              <a:rPr lang="en-US" dirty="0"/>
-              <a:t>       runAllTests.py</a:t>
-            </a:r>
-          </a:p>
-          <a:p>
-            <a:pPr marL="68580" indent="0">
-              <a:buNone/>
-            </a:pPr>
-            <a:r>
-              <a:rPr lang="en-US" dirty="0"/>
-              <a:t>    /</a:t>
-            </a:r>
-            <a:r>
-              <a:rPr lang="en-US" dirty="0" err="1"/>
-              <a:t>testCases</a:t>
-            </a:r>
-            <a:endParaRPr lang="en-US" dirty="0"/>
-          </a:p>
-          <a:p>
-            <a:pPr marL="68580" indent="0">
-              <a:buNone/>
-            </a:pPr>
-            <a:r>
-              <a:rPr lang="en-US" dirty="0"/>
-              <a:t>       testCase1.txt</a:t>
-            </a:r>
-          </a:p>
-          <a:p>
-            <a:pPr marL="68580" indent="0">
-              <a:buNone/>
-            </a:pPr>
-            <a:r>
-              <a:rPr lang="en-US" dirty="0"/>
-              <a:t>       testCase2.txt</a:t>
-            </a:r>
-          </a:p>
-          <a:p>
-            <a:pPr marL="68580" indent="0">
-              <a:buNone/>
-            </a:pPr>
-            <a:r>
-              <a:rPr lang="en-US" dirty="0"/>
-              <a:t>       </a:t>
-            </a:r>
-            <a:r>
-              <a:rPr lang="en-US" dirty="0" smtClean="0"/>
-              <a:t>testCase3.txt</a:t>
-            </a:r>
-            <a:endParaRPr lang="en-US" dirty="0"/>
-          </a:p>
-          <a:p>
-            <a:pPr marL="68580" indent="0">
-              <a:buNone/>
-            </a:pPr>
-            <a:r>
-              <a:rPr lang="en-US" dirty="0"/>
-              <a:t>    /</a:t>
-            </a:r>
-            <a:r>
-              <a:rPr lang="en-US" dirty="0" err="1"/>
-              <a:t>testCasesExecutables</a:t>
-            </a:r>
-            <a:endParaRPr lang="en-US" dirty="0"/>
-          </a:p>
-          <a:p>
-            <a:pPr marL="68580" indent="0">
-              <a:buNone/>
-            </a:pPr>
-            <a:r>
-              <a:rPr lang="en-US" dirty="0" smtClean="0"/>
-              <a:t>    /</a:t>
-            </a:r>
-            <a:r>
-              <a:rPr lang="en-US" dirty="0"/>
-              <a:t>temp</a:t>
-            </a:r>
-          </a:p>
-          <a:p>
-            <a:pPr marL="68580" indent="0">
-              <a:buNone/>
-            </a:pPr>
-            <a:r>
-              <a:rPr lang="en-US" dirty="0"/>
-              <a:t>       results.html</a:t>
-            </a:r>
-          </a:p>
-          <a:p>
-            <a:pPr marL="68580" indent="0">
-              <a:buNone/>
-            </a:pPr>
-            <a:r>
-              <a:rPr lang="en-US" dirty="0"/>
-              <a:t>    /oracles</a:t>
-            </a:r>
-          </a:p>
-          <a:p>
-            <a:pPr marL="68580" indent="0">
-              <a:buNone/>
-            </a:pPr>
-            <a:r>
-              <a:rPr lang="en-US" dirty="0"/>
-              <a:t>    /docs</a:t>
-            </a:r>
-          </a:p>
-          <a:p>
-            <a:pPr marL="68580" indent="0">
-              <a:buNone/>
-            </a:pPr>
-            <a:r>
-              <a:rPr lang="en-US" dirty="0"/>
-              <a:t>       </a:t>
-            </a:r>
-            <a:r>
-              <a:rPr lang="en-US" dirty="0" smtClean="0"/>
-              <a:t>README.txt</a:t>
-            </a:r>
-          </a:p>
-          <a:p>
-            <a:pPr marL="68580" indent="0">
-              <a:buNone/>
-            </a:pPr>
-            <a:r>
-              <a:rPr lang="en-US" dirty="0" smtClean="0"/>
-              <a:t>    /opt</a:t>
-            </a:r>
-            <a:endParaRPr lang="en-US" dirty="0"/>
-          </a:p>
-          <a:p>
-            <a:pPr marL="68580" indent="0">
-              <a:buNone/>
-            </a:pPr>
-            <a:r>
-              <a:rPr lang="en-US" dirty="0"/>
-              <a:t>    /reports</a:t>
-            </a:r>
-          </a:p>
-          <a:p>
-            <a:pPr marL="68580" indent="0">
-              <a:buNone/>
-            </a:pPr>
-            <a:r>
-              <a:rPr lang="en-US" dirty="0"/>
-              <a:t>       testReport.html</a:t>
-            </a:r>
           </a:p>
         </p:txBody>
       </p:sp>
     </p:spTree>
     <p:extLst>
       <p:ext uri="{BB962C8B-B14F-4D97-AF65-F5344CB8AC3E}">
-        <p14:creationId xmlns:p14="http://schemas.microsoft.com/office/powerpoint/2010/main" val="3133153497"/>
+        <p14:creationId xmlns:p14="http://schemas.microsoft.com/office/powerpoint/2010/main" val="2710107771"/>
       </p:ext>
     </p:extLst>
   </p:cSld>
@@ -5783,7 +5795,7 @@
           <a:p>
             <a:r>
               <a:rPr lang="en-US" dirty="0" smtClean="0"/>
-              <a:t>The Framework: How It Works</a:t>
+              <a:t>The Framework: Architecture</a:t>
             </a:r>
             <a:endParaRPr lang="en-US" dirty="0"/>
           </a:p>
@@ -5799,99 +5811,330 @@
             <p:ph idx="1"/>
           </p:nvPr>
         </p:nvSpPr>
-        <p:spPr/>
+        <p:spPr>
+          <a:xfrm>
+            <a:off x="1219200" y="1783560"/>
+            <a:ext cx="2098766" cy="4762713"/>
+          </a:xfrm>
+        </p:spPr>
         <p:txBody>
           <a:bodyPr>
-            <a:normAutofit fontScale="77500" lnSpcReduction="20000"/>
+            <a:normAutofit fontScale="40000" lnSpcReduction="20000"/>
           </a:bodyPr>
           <a:lstStyle/>
           <a:p>
-            <a:r>
-              <a:rPr lang="en-US" dirty="0" smtClean="0"/>
-              <a:t>runAllTests.py reads through all files in </a:t>
-            </a:r>
-            <a:r>
-              <a:rPr lang="en-US" dirty="0" err="1" smtClean="0"/>
+            <a:pPr marL="68580" indent="0">
+              <a:buNone/>
+            </a:pPr>
+            <a:r>
+              <a:rPr lang="en-US" dirty="0" smtClean="0"/>
+              <a:t>/</a:t>
+            </a:r>
+            <a:r>
+              <a:rPr lang="en-US" dirty="0" err="1"/>
+              <a:t>TestAutomation</a:t>
+            </a:r>
+            <a:endParaRPr lang="en-US" dirty="0"/>
+          </a:p>
+          <a:p>
+            <a:pPr marL="68580" indent="0">
+              <a:buNone/>
+            </a:pPr>
+            <a:r>
+              <a:rPr lang="en-US" dirty="0"/>
+              <a:t>    /project </a:t>
+            </a:r>
+          </a:p>
+          <a:p>
+            <a:pPr marL="68580" indent="0">
+              <a:buNone/>
+            </a:pPr>
+            <a:r>
+              <a:rPr lang="en-US" dirty="0"/>
+              <a:t>       /</a:t>
+            </a:r>
+            <a:r>
+              <a:rPr lang="en-US" dirty="0" err="1"/>
+              <a:t>src</a:t>
+            </a:r>
+            <a:endParaRPr lang="en-US" dirty="0"/>
+          </a:p>
+          <a:p>
+            <a:pPr marL="68580" indent="0">
+              <a:buNone/>
+            </a:pPr>
+            <a:r>
+              <a:rPr lang="en-US" dirty="0"/>
+              <a:t>       /bin</a:t>
+            </a:r>
+          </a:p>
+          <a:p>
+            <a:pPr marL="68580" indent="0">
+              <a:buNone/>
+            </a:pPr>
+            <a:r>
+              <a:rPr lang="en-US" dirty="0"/>
+              <a:t>    /scripts</a:t>
+            </a:r>
+          </a:p>
+          <a:p>
+            <a:pPr marL="68580" indent="0">
+              <a:buNone/>
+            </a:pPr>
+            <a:r>
+              <a:rPr lang="en-US" dirty="0"/>
+              <a:t>       runAllTests.py</a:t>
+            </a:r>
+          </a:p>
+          <a:p>
+            <a:pPr marL="68580" indent="0">
+              <a:buNone/>
+            </a:pPr>
+            <a:r>
+              <a:rPr lang="en-US" dirty="0"/>
+              <a:t>    /</a:t>
+            </a:r>
+            <a:r>
+              <a:rPr lang="en-US" dirty="0" err="1"/>
               <a:t>testCases</a:t>
             </a:r>
-            <a:r>
-              <a:rPr lang="en-US" dirty="0" smtClean="0"/>
-              <a:t> directory</a:t>
-            </a:r>
-          </a:p>
-          <a:p>
-            <a:r>
-              <a:rPr lang="en-US" dirty="0" smtClean="0"/>
-              <a:t>All values in each file in the </a:t>
-            </a:r>
-            <a:r>
-              <a:rPr lang="en-US" dirty="0" err="1" smtClean="0"/>
-              <a:t>testCases</a:t>
-            </a:r>
-            <a:r>
-              <a:rPr lang="en-US" dirty="0" smtClean="0"/>
-              <a:t> directory is added to a dictionary</a:t>
-            </a:r>
-          </a:p>
-          <a:p>
-            <a:r>
-              <a:rPr lang="en-US" dirty="0" smtClean="0"/>
-              <a:t>Each dictionary is added to a list, which contains all dictionaries for all test cases</a:t>
-            </a:r>
-          </a:p>
-          <a:p>
-            <a:r>
-              <a:rPr lang="en-US" dirty="0" smtClean="0"/>
-              <a:t>We no longer require files under the </a:t>
-            </a:r>
-            <a:r>
-              <a:rPr lang="en-US" dirty="0" err="1" smtClean="0"/>
-              <a:t>testCaseExecutables</a:t>
-            </a:r>
-            <a:r>
-              <a:rPr lang="en-US" dirty="0" smtClean="0"/>
-              <a:t> directory, all required information is in the test case files. This avoids repeated code in individual executable files.</a:t>
-            </a:r>
-          </a:p>
-          <a:p>
-            <a:r>
-              <a:rPr lang="en-US" dirty="0" smtClean="0"/>
-              <a:t>runAllTests.py will execute the method being tested based on the language noted in the file</a:t>
-            </a:r>
-          </a:p>
-          <a:p>
-            <a:r>
-              <a:rPr lang="en-US" dirty="0" smtClean="0"/>
-              <a:t>Python files test the GUI using Selenium to simulate mouse clicks/keyboard input</a:t>
-            </a:r>
-          </a:p>
-          <a:p>
-            <a:r>
-              <a:rPr lang="en-US" dirty="0" smtClean="0"/>
-              <a:t>JavaScript files test the functions directly</a:t>
-            </a:r>
-          </a:p>
-          <a:p>
-            <a:r>
-              <a:rPr lang="en-US" dirty="0" smtClean="0"/>
-              <a:t>JavaScript tests use </a:t>
-            </a:r>
-            <a:r>
-              <a:rPr lang="en-US" dirty="0" err="1" smtClean="0"/>
-              <a:t>QUnit</a:t>
-            </a:r>
-            <a:r>
-              <a:rPr lang="en-US" dirty="0" smtClean="0"/>
-              <a:t>, a JavaScript testing framework </a:t>
-            </a:r>
             <a:endParaRPr lang="en-US" dirty="0"/>
+          </a:p>
+          <a:p>
+            <a:pPr marL="68580" indent="0">
+              <a:buNone/>
+            </a:pPr>
+            <a:r>
+              <a:rPr lang="en-US" dirty="0"/>
+              <a:t>       testCase1.txt</a:t>
+            </a:r>
+          </a:p>
+          <a:p>
+            <a:pPr marL="68580" indent="0">
+              <a:buNone/>
+            </a:pPr>
+            <a:r>
+              <a:rPr lang="en-US" dirty="0"/>
+              <a:t>       testCase2.txt</a:t>
+            </a:r>
+          </a:p>
+          <a:p>
+            <a:pPr marL="68580" indent="0">
+              <a:buNone/>
+            </a:pPr>
+            <a:r>
+              <a:rPr lang="en-US" dirty="0"/>
+              <a:t>       </a:t>
+            </a:r>
+            <a:r>
+              <a:rPr lang="en-US" dirty="0" smtClean="0"/>
+              <a:t>testCase3.txt</a:t>
+            </a:r>
+            <a:endParaRPr lang="en-US" dirty="0"/>
+          </a:p>
+          <a:p>
+            <a:pPr marL="68580" indent="0">
+              <a:buNone/>
+            </a:pPr>
+            <a:r>
+              <a:rPr lang="en-US" dirty="0"/>
+              <a:t>    /</a:t>
+            </a:r>
+            <a:r>
+              <a:rPr lang="en-US" dirty="0" err="1"/>
+              <a:t>testCasesExecutables</a:t>
+            </a:r>
+            <a:endParaRPr lang="en-US" dirty="0"/>
+          </a:p>
+          <a:p>
+            <a:pPr marL="68580" indent="0">
+              <a:buNone/>
+            </a:pPr>
+            <a:r>
+              <a:rPr lang="en-US" dirty="0" smtClean="0"/>
+              <a:t>    /</a:t>
+            </a:r>
+            <a:r>
+              <a:rPr lang="en-US" dirty="0"/>
+              <a:t>temp</a:t>
+            </a:r>
+          </a:p>
+          <a:p>
+            <a:pPr marL="68580" indent="0">
+              <a:buNone/>
+            </a:pPr>
+            <a:r>
+              <a:rPr lang="en-US" dirty="0" smtClean="0"/>
+              <a:t>   /</a:t>
+            </a:r>
+            <a:r>
+              <a:rPr lang="en-US" dirty="0"/>
+              <a:t>oracles</a:t>
+            </a:r>
+          </a:p>
+          <a:p>
+            <a:pPr marL="68580" indent="0">
+              <a:buNone/>
+            </a:pPr>
+            <a:r>
+              <a:rPr lang="en-US" dirty="0"/>
+              <a:t>    /docs</a:t>
+            </a:r>
+          </a:p>
+          <a:p>
+            <a:pPr marL="68580" indent="0">
+              <a:buNone/>
+            </a:pPr>
+            <a:r>
+              <a:rPr lang="en-US" dirty="0"/>
+              <a:t>       </a:t>
+            </a:r>
+            <a:r>
+              <a:rPr lang="en-US" dirty="0" smtClean="0"/>
+              <a:t>README.txt</a:t>
+            </a:r>
+          </a:p>
+          <a:p>
+            <a:pPr marL="68580" indent="0">
+              <a:buNone/>
+            </a:pPr>
+            <a:r>
+              <a:rPr lang="en-US" dirty="0" smtClean="0"/>
+              <a:t>    </a:t>
+            </a:r>
+            <a:r>
+              <a:rPr lang="en-US" dirty="0" smtClean="0"/>
+              <a:t>/</a:t>
+            </a:r>
+            <a:r>
+              <a:rPr lang="en-US" dirty="0" smtClean="0"/>
+              <a:t>framework</a:t>
+            </a:r>
+            <a:endParaRPr lang="en-US" dirty="0"/>
+          </a:p>
+          <a:p>
+            <a:pPr marL="68580" indent="0">
+              <a:buNone/>
+            </a:pPr>
+            <a:r>
+              <a:rPr lang="en-US" dirty="0"/>
+              <a:t>    /reports</a:t>
+            </a:r>
+          </a:p>
+          <a:p>
+            <a:pPr marL="68580" indent="0">
+              <a:buNone/>
+            </a:pPr>
+            <a:r>
+              <a:rPr lang="en-US" dirty="0"/>
+              <a:t>       </a:t>
+            </a:r>
+            <a:r>
+              <a:rPr lang="en-US" dirty="0" smtClean="0"/>
+              <a:t>report_&lt;date&gt;.html</a:t>
+            </a:r>
+            <a:endParaRPr lang="en-US" dirty="0"/>
+          </a:p>
+        </p:txBody>
+      </p:sp>
+      <p:sp>
+        <p:nvSpPr>
+          <p:cNvPr id="4" name="TextBox 3"/>
+          <p:cNvSpPr txBox="1"/>
+          <p:nvPr/>
+        </p:nvSpPr>
+        <p:spPr>
+          <a:xfrm>
+            <a:off x="3997234" y="1783560"/>
+            <a:ext cx="8194766" cy="3539430"/>
+          </a:xfrm>
+          <a:prstGeom prst="rect">
+            <a:avLst/>
+          </a:prstGeom>
+          <a:noFill/>
+        </p:spPr>
+        <p:txBody>
+          <a:bodyPr wrap="square" rtlCol="0">
+            <a:spAutoFit/>
+          </a:bodyPr>
+          <a:lstStyle/>
+          <a:p>
+            <a:r>
+              <a:rPr lang="en-US" sz="3200" dirty="0"/>
+              <a:t> /</a:t>
+            </a:r>
+            <a:r>
+              <a:rPr lang="en-US" sz="3200" dirty="0" smtClean="0"/>
+              <a:t>framework</a:t>
+            </a:r>
+          </a:p>
+          <a:p>
+            <a:r>
+              <a:rPr lang="en-US" sz="3200" dirty="0"/>
+              <a:t>	</a:t>
+            </a:r>
+            <a:r>
+              <a:rPr lang="en-US" sz="3200" dirty="0" smtClean="0"/>
+              <a:t>/drivers</a:t>
+            </a:r>
+          </a:p>
+          <a:p>
+            <a:r>
+              <a:rPr lang="en-US" sz="3200" dirty="0"/>
+              <a:t>	</a:t>
+            </a:r>
+            <a:r>
+              <a:rPr lang="en-US" sz="3200" dirty="0" smtClean="0"/>
+              <a:t>	/assets</a:t>
+            </a:r>
+          </a:p>
+          <a:p>
+            <a:r>
+              <a:rPr lang="en-US" sz="3200" dirty="0"/>
+              <a:t>	</a:t>
+            </a:r>
+            <a:r>
+              <a:rPr lang="en-US" sz="3200" dirty="0" smtClean="0"/>
+              <a:t>	selenium_driver.py</a:t>
+            </a:r>
+          </a:p>
+          <a:p>
+            <a:r>
+              <a:rPr lang="en-US" sz="3200" dirty="0"/>
+              <a:t>	</a:t>
+            </a:r>
+            <a:r>
+              <a:rPr lang="en-US" sz="3200" dirty="0" smtClean="0"/>
+              <a:t>	qunit_driver.py</a:t>
+            </a:r>
+          </a:p>
+          <a:p>
+            <a:r>
+              <a:rPr lang="en-US" sz="3200" dirty="0"/>
+              <a:t>	</a:t>
+            </a:r>
+            <a:r>
+              <a:rPr lang="en-US" sz="3200" dirty="0" smtClean="0"/>
+              <a:t>/assets</a:t>
+            </a:r>
+          </a:p>
+          <a:p>
+            <a:r>
+              <a:rPr lang="en-US" sz="3200" dirty="0"/>
+              <a:t>	</a:t>
+            </a:r>
+            <a:r>
+              <a:rPr lang="en-US" sz="3200" dirty="0" smtClean="0"/>
+              <a:t>TestCase.py</a:t>
+            </a:r>
+            <a:endParaRPr lang="en-US" sz="3200" dirty="0"/>
           </a:p>
         </p:txBody>
       </p:sp>
     </p:spTree>
     <p:extLst>
       <p:ext uri="{BB962C8B-B14F-4D97-AF65-F5344CB8AC3E}">
-        <p14:creationId xmlns:p14="http://schemas.microsoft.com/office/powerpoint/2010/main" val="3382507055"/>
+        <p14:creationId xmlns:p14="http://schemas.microsoft.com/office/powerpoint/2010/main" val="3133153497"/>
       </p:ext>
     </p:extLst>
   </p:cSld>
@@ -5947,7 +6190,7 @@
           <a:p>
             <a:r>
               <a:rPr lang="en-US" dirty="0" smtClean="0"/>
-              <a:t>Demo</a:t>
+              <a:t>The Framework: How It Works</a:t>
             </a:r>
             <a:endParaRPr lang="en-US" dirty="0"/>
           </a:p>
@@ -5965,25 +6208,97 @@
         </p:nvSpPr>
         <p:spPr/>
         <p:txBody>
-          <a:bodyPr/>
-          <a:lstStyle/>
-          <a:p>
-            <a:r>
-              <a:rPr lang="en-US" dirty="0" smtClean="0"/>
-              <a:t>Please join us for a demo of our automated </a:t>
-            </a:r>
-            <a:r>
-              <a:rPr lang="en-US" smtClean="0"/>
-              <a:t>testing framework.</a:t>
-            </a:r>
-            <a:endParaRPr lang="en-US"/>
+          <a:bodyPr>
+            <a:normAutofit fontScale="77500" lnSpcReduction="20000"/>
+          </a:bodyPr>
+          <a:lstStyle/>
+          <a:p>
+            <a:r>
+              <a:rPr lang="en-US" dirty="0" smtClean="0"/>
+              <a:t>runAllTests.py reads through all files in </a:t>
+            </a:r>
+            <a:r>
+              <a:rPr lang="en-US" dirty="0" err="1" smtClean="0"/>
+              <a:t>testCases</a:t>
+            </a:r>
+            <a:r>
+              <a:rPr lang="en-US" dirty="0" smtClean="0"/>
+              <a:t> directory</a:t>
+            </a:r>
+          </a:p>
+          <a:p>
+            <a:r>
+              <a:rPr lang="en-US" dirty="0" smtClean="0"/>
+              <a:t>All values in each file in the </a:t>
+            </a:r>
+            <a:r>
+              <a:rPr lang="en-US" dirty="0" err="1" smtClean="0"/>
+              <a:t>testCases</a:t>
+            </a:r>
+            <a:r>
+              <a:rPr lang="en-US" dirty="0" smtClean="0"/>
+              <a:t> directory is added to a dictionary</a:t>
+            </a:r>
+          </a:p>
+          <a:p>
+            <a:r>
+              <a:rPr lang="en-US" dirty="0" smtClean="0"/>
+              <a:t>Each dictionary is added to a list, which contains all dictionaries for all test cases</a:t>
+            </a:r>
+          </a:p>
+          <a:p>
+            <a:r>
+              <a:rPr lang="en-US" dirty="0" smtClean="0"/>
+              <a:t>We no longer require files under the </a:t>
+            </a:r>
+            <a:r>
+              <a:rPr lang="en-US" dirty="0" err="1" smtClean="0"/>
+              <a:t>testCaseExecutables</a:t>
+            </a:r>
+            <a:r>
+              <a:rPr lang="en-US" dirty="0" smtClean="0"/>
+              <a:t> directory, all required information is in the test case files. This avoids repeated code in individual executable files.</a:t>
+            </a:r>
+          </a:p>
+          <a:p>
+            <a:r>
+              <a:rPr lang="en-US" dirty="0" smtClean="0"/>
+              <a:t>runAllTests.py will execute the method being tested based on the language noted in the file</a:t>
+            </a:r>
+          </a:p>
+          <a:p>
+            <a:r>
+              <a:rPr lang="en-US" dirty="0" smtClean="0"/>
+              <a:t>Python files test the GUI using Selenium to simulate mouse clicks/keyboard input</a:t>
+            </a:r>
+          </a:p>
+          <a:p>
+            <a:r>
+              <a:rPr lang="en-US" dirty="0" smtClean="0"/>
+              <a:t>JavaScript files test the functions directly</a:t>
+            </a:r>
+          </a:p>
+          <a:p>
+            <a:r>
+              <a:rPr lang="en-US" dirty="0" smtClean="0"/>
+              <a:t>JavaScript tests use </a:t>
+            </a:r>
+            <a:r>
+              <a:rPr lang="en-US" dirty="0" err="1" smtClean="0"/>
+              <a:t>QUnit</a:t>
+            </a:r>
+            <a:r>
+              <a:rPr lang="en-US" dirty="0" smtClean="0"/>
+              <a:t>, a JavaScript testing framework </a:t>
+            </a:r>
+            <a:endParaRPr lang="en-US" dirty="0"/>
           </a:p>
         </p:txBody>
       </p:sp>
     </p:spTree>
     <p:extLst>
       <p:ext uri="{BB962C8B-B14F-4D97-AF65-F5344CB8AC3E}">
-        <p14:creationId xmlns:p14="http://schemas.microsoft.com/office/powerpoint/2010/main" val="1662294202"/>
+        <p14:creationId xmlns:p14="http://schemas.microsoft.com/office/powerpoint/2010/main" val="3382507055"/>
       </p:ext>
     </p:extLst>
   </p:cSld>
@@ -6038,58 +6353,124 @@
           <a:lstStyle/>
           <a:p>
             <a:r>
-              <a:rPr lang="en-US" dirty="0" smtClean="0"/>
-              <a:t>The Framework: The Test Case Files</a:t>
-            </a:r>
-            <a:endParaRPr lang="en-US" dirty="0"/>
+              <a:rPr lang="en-US" dirty="0"/>
+              <a:t>The Framework: How It Works</a:t>
+            </a:r>
           </a:p>
         </p:txBody>
       </p:sp>
       <p:pic>
         <p:nvPicPr>
-          <p:cNvPr id="3074" name="Picture 2" descr="http://i.imgur.com/tRQSzrL.png"/>
+          <p:cNvPr id="4" name="Picture 3"/>
           <p:cNvPicPr>
-            <a:picLocks noChangeAspect="1" noChangeArrowheads="1"/>
+            <a:picLocks noChangeAspect="1"/>
           </p:cNvPicPr>
           <p:nvPr/>
         </p:nvPicPr>
         <p:blipFill>
-          <a:blip r:embed="rId2">
-            <a:extLst>
-              <a:ext uri="{28A0092B-C50C-407E-A947-70E740481C1C}">
-                <a14:useLocalDpi xmlns:a14="http://schemas.microsoft.com/office/drawing/2010/main" val="0"/>
-              </a:ext>
-            </a:extLst>
-          </a:blip>
-          <a:srcRect/>
+          <a:blip r:embed="rId2"/>
           <a:stretch>
             <a:fillRect/>
           </a:stretch>
         </p:blipFill>
-        <p:spPr bwMode="auto">
+        <p:spPr>
           <a:xfrm>
-            <a:off x="760209" y="1727800"/>
-            <a:ext cx="11281182" cy="3789772"/>
+            <a:off x="0" y="1426464"/>
+            <a:ext cx="7641771" cy="5431536"/>
+          </a:xfrm>
+          <a:prstGeom prst="rect">
+            <a:avLst/>
+          </a:prstGeom>
+        </p:spPr>
+      </p:pic>
+      <p:sp>
+        <p:nvSpPr>
+          <p:cNvPr id="5" name="TextBox 4"/>
+          <p:cNvSpPr txBox="1"/>
+          <p:nvPr/>
+        </p:nvSpPr>
+        <p:spPr>
+          <a:xfrm>
+            <a:off x="7863840" y="1426464"/>
+            <a:ext cx="3827417" cy="2585323"/>
           </a:xfrm>
           <a:prstGeom prst="rect">
             <a:avLst/>
           </a:prstGeom>
           <a:noFill/>
-          <a:extLst>
-            <a:ext uri="{909E8E84-426E-40DD-AFC4-6F175D3DCCD1}">
-              <a14:hiddenFill xmlns:a14="http://schemas.microsoft.com/office/drawing/2010/main">
-                <a:solidFill>
-                  <a:srgbClr val="FFFFFF"/>
-                </a:solidFill>
-              </a14:hiddenFill>
-            </a:ext>
-          </a:extLst>
         </p:spPr>
-      </p:pic>
+        <p:txBody>
+          <a:bodyPr wrap="square" rtlCol="0">
+            <a:spAutoFit/>
+          </a:bodyPr>
+          <a:lstStyle/>
+          <a:p>
+            <a:r>
+              <a:rPr lang="en-US" dirty="0" smtClean="0"/>
+              <a:t>Each test case specifies a driver (the current framework has two drivers: </a:t>
+            </a:r>
+            <a:r>
+              <a:rPr lang="en-US" dirty="0" err="1" smtClean="0"/>
+              <a:t>selenium_driver</a:t>
+            </a:r>
+            <a:r>
+              <a:rPr lang="en-US" dirty="0" smtClean="0"/>
+              <a:t> and </a:t>
+            </a:r>
+            <a:r>
+              <a:rPr lang="en-US" dirty="0" err="1" smtClean="0"/>
+              <a:t>qunit_driver</a:t>
+            </a:r>
+            <a:r>
+              <a:rPr lang="en-US" dirty="0" smtClean="0"/>
+              <a:t>. The specified driver is imported during runtime and the generic ‘drive’ function within the driver is called with </a:t>
+            </a:r>
+            <a:r>
+              <a:rPr lang="en-US" dirty="0" err="1" smtClean="0"/>
+              <a:t>test_structure</a:t>
+            </a:r>
+            <a:r>
+              <a:rPr lang="en-US" dirty="0" smtClean="0"/>
+              <a:t> data structure from a specific test case object. </a:t>
+            </a:r>
+            <a:endParaRPr lang="en-US" dirty="0"/>
+          </a:p>
+        </p:txBody>
+      </p:sp>
+      <p:sp>
+        <p:nvSpPr>
+          <p:cNvPr id="6" name="TextBox 5"/>
+          <p:cNvSpPr txBox="1"/>
+          <p:nvPr/>
+        </p:nvSpPr>
+        <p:spPr>
+          <a:xfrm>
+            <a:off x="7863839" y="4142232"/>
+            <a:ext cx="3827417" cy="2308324"/>
+          </a:xfrm>
+          <a:prstGeom prst="rect">
+            <a:avLst/>
+          </a:prstGeom>
+          <a:noFill/>
+        </p:spPr>
+        <p:txBody>
+          <a:bodyPr wrap="square" rtlCol="0">
+            <a:spAutoFit/>
+          </a:bodyPr>
+          <a:lstStyle/>
+          <a:p>
+            <a:r>
+              <a:rPr lang="en-US" sz="2400" dirty="0" smtClean="0"/>
+              <a:t>This lightweight generic driver interface allows the framework to be extended to add any number of drivers testing any number of different things.</a:t>
+            </a:r>
+            <a:endParaRPr lang="en-US" sz="2400" dirty="0"/>
+          </a:p>
+        </p:txBody>
+      </p:sp>
     </p:spTree>
     <p:extLst>
       <p:ext uri="{BB962C8B-B14F-4D97-AF65-F5344CB8AC3E}">
-        <p14:creationId xmlns:p14="http://schemas.microsoft.com/office/powerpoint/2010/main" val="3358293752"/>
+        <p14:creationId xmlns:p14="http://schemas.microsoft.com/office/powerpoint/2010/main" val="324883797"/>
       </p:ext>
     </p:extLst>
   </p:cSld>

</xml_diff>